<commit_message>
Istaisytas "Prisistatyma" i "Prisistatymas"
</commit_message>
<xml_diff>
--- a/UML/Pristatymas.pptx
+++ b/UML/Pristatymas.pptx
@@ -120,6 +120,10 @@
     </p:ext>
   </p:extLst>
 </p:presentation>
+</file>
+
+<file path=ppt/revisionInfo.xml><?xml version="1.0" encoding="utf-8"?>
+<p1510:revInfo xmlns:a="http://schemas.openxmlformats.org/drawingml/2006/main" xmlns:r="http://schemas.openxmlformats.org/officeDocument/2006/relationships" xmlns:p1510="http://schemas.microsoft.com/office/powerpoint/2015/10/main"/>
 </file>
 
 <file path=ppt/notesMasters/notesMaster1.xml><?xml version="1.0" encoding="utf-8"?>
@@ -3911,6 +3915,10 @@
             <a:r>
               <a:rPr lang="lt-LT" dirty="0" err="1"/>
               <a:t>pasiskirstyma</a:t>
+            </a:r>
+            <a:r>
+              <a:rPr lang="en-US"/>
+              <a:t>s</a:t>
             </a:r>
             <a:endParaRPr lang="lt-LT" dirty="0"/>
           </a:p>

</xml_diff>